<commit_message>
Added Owners to each Section
</commit_message>
<xml_diff>
--- a/presentation/ML_housing_presentation_v1.pptx
+++ b/presentation/ML_housing_presentation_v1.pptx
@@ -13,7 +13,7 @@
     <p:sldId id="266" r:id="rId7"/>
     <p:sldId id="268" r:id="rId8"/>
     <p:sldId id="270" r:id="rId9"/>
-    <p:sldId id="271" r:id="rId10"/>
+    <p:sldId id="272" r:id="rId10"/>
   </p:sldIdLst>
   <p:sldSz cx="12192000" cy="6858000"/>
   <p:notesSz cx="6858000" cy="9144000"/>
@@ -8193,7 +8193,7 @@
             </a:pPr>
             <a:r>
               <a:rPr lang="en-US" sz="2000" spc="10" dirty="0"/>
-              <a:t>Simple workflow. Example: Everyone tried everything &gt; debated ideas &gt; locked in best model.</a:t>
+              <a:t>Simple workflow. Example: Everyone tried everything &gt; debated ideas &gt; locked in best model. ALE</a:t>
             </a:r>
           </a:p>
         </p:txBody>
@@ -8368,7 +8368,10 @@
                 <a:spcPct val="150000"/>
               </a:lnSpc>
             </a:pPr>
-            <a:endParaRPr lang="en-US" sz="2000" spc="10" dirty="0"/>
+            <a:r>
+              <a:rPr lang="en-US" sz="2000" spc="10" dirty="0"/>
+              <a:t> RAUL</a:t>
+            </a:r>
           </a:p>
         </p:txBody>
       </p:sp>
@@ -8572,7 +8575,7 @@
             </a:pPr>
             <a:r>
               <a:rPr lang="en-US" sz="2000" spc="10" dirty="0"/>
-              <a:t>Dealing with Outliers</a:t>
+              <a:t>Dealing with Outliers  HELO</a:t>
             </a:r>
           </a:p>
         </p:txBody>
@@ -8656,7 +8659,7 @@
         </p:nvSpPr>
         <p:spPr>
           <a:xfrm>
-            <a:off x="1752600" y="2009775"/>
+            <a:off x="1781175" y="2009775"/>
             <a:ext cx="8553450" cy="3448050"/>
           </a:xfrm>
           <a:prstGeom prst="rect">
@@ -8731,7 +8734,10 @@
               <a:buFont typeface="Wingdings" panose="05000000000000000000" pitchFamily="2" charset="2"/>
               <a:buChar char="§"/>
             </a:pPr>
-            <a:endParaRPr lang="en-US" sz="2000" spc="10" dirty="0"/>
+            <a:r>
+              <a:rPr lang="en-US" sz="2000" spc="10" dirty="0"/>
+              <a:t>  AKAY</a:t>
+            </a:r>
           </a:p>
         </p:txBody>
       </p:sp>
@@ -8788,14 +8794,14 @@
           <a:p>
             <a:r>
               <a:rPr lang="en-US" b="1" dirty="0"/>
-              <a:t>Feature Selection</a:t>
+              <a:t>Fitting Model</a:t>
             </a:r>
             <a:br>
               <a:rPr lang="en-US" b="1" dirty="0"/>
             </a:br>
             <a:r>
               <a:rPr lang="en-US" sz="2800" dirty="0"/>
-              <a:t>XXXX</a:t>
+              <a:t>Intro</a:t>
             </a:r>
           </a:p>
         </p:txBody>
@@ -8852,18 +8858,8 @@
             </a:pPr>
             <a:r>
               <a:rPr lang="en-US" sz="2000" b="1" spc="10" dirty="0"/>
-              <a:t>Goal: show criteria, and which features made it to the model</a:t>
-            </a:r>
-          </a:p>
-          <a:p>
-            <a:pPr marL="342900" indent="-342900">
-              <a:lnSpc>
-                <a:spcPct val="150000"/>
-              </a:lnSpc>
-              <a:buFont typeface="Wingdings" panose="05000000000000000000" pitchFamily="2" charset="2"/>
-              <a:buChar char="§"/>
-            </a:pPr>
-            <a:endParaRPr lang="en-US" sz="2000" spc="10" dirty="0"/>
+              <a:t>HELO / AKAY</a:t>
+            </a:r>
           </a:p>
         </p:txBody>
       </p:sp>
@@ -8920,14 +8916,14 @@
           <a:p>
             <a:r>
               <a:rPr lang="en-US" b="1" dirty="0"/>
-              <a:t>Optimizing Model</a:t>
+              <a:t>Fitting Model</a:t>
             </a:r>
             <a:br>
               <a:rPr lang="en-US" b="1" dirty="0"/>
             </a:br>
             <a:r>
               <a:rPr lang="en-US" sz="2800" dirty="0"/>
-              <a:t>XXXX</a:t>
+              <a:t>Feature Selection</a:t>
             </a:r>
           </a:p>
         </p:txBody>
@@ -8983,9 +8979,10 @@
               </a:lnSpc>
             </a:pPr>
             <a:r>
-              <a:rPr lang="en-US" sz="2000" b="1" spc="10" dirty="0"/>
-              <a:t>Goal: final iterations and optimization needed to minimize RMSE/Accuracy</a:t>
-            </a:r>
+              <a:rPr lang="en-US" sz="2000" b="1" spc="10"/>
+              <a:t>RAUL /ALE</a:t>
+            </a:r>
+            <a:endParaRPr lang="en-US" sz="2000" b="1" spc="10" dirty="0"/>
           </a:p>
           <a:p>
             <a:pPr marL="342900" indent="-342900">
@@ -9002,7 +8999,7 @@
     </p:spTree>
     <p:extLst>
       <p:ext uri="{BB962C8B-B14F-4D97-AF65-F5344CB8AC3E}">
-        <p14:creationId xmlns:p14="http://schemas.microsoft.com/office/powerpoint/2010/main" val="3196092687"/>
+        <p14:creationId xmlns:p14="http://schemas.microsoft.com/office/powerpoint/2010/main" val="3458748806"/>
       </p:ext>
     </p:extLst>
   </p:cSld>

</xml_diff>